<commit_message>
Docs: added Feedback file , minor changes to the presentation
</commit_message>
<xml_diff>
--- a/docs/final presentation.pptx
+++ b/docs/final presentation.pptx
@@ -1233,7 +1233,7 @@
           <a:p>
             <a:fld id="{C9F7DFBD-92B2-44B7-952A-8C833C4590A2}" type="datetimeFigureOut">
               <a:rPr lang="en-IL" smtClean="0"/>
-              <a:t>01/01/2021</a:t>
+              <a:t>02/01/2021</a:t>
             </a:fld>
             <a:endParaRPr lang="en-IL"/>
           </a:p>
@@ -1433,7 +1433,7 @@
           <a:p>
             <a:fld id="{C9F7DFBD-92B2-44B7-952A-8C833C4590A2}" type="datetimeFigureOut">
               <a:rPr lang="en-IL" smtClean="0"/>
-              <a:t>01/01/2021</a:t>
+              <a:t>02/01/2021</a:t>
             </a:fld>
             <a:endParaRPr lang="en-IL"/>
           </a:p>
@@ -1643,7 +1643,7 @@
           <a:p>
             <a:fld id="{C9F7DFBD-92B2-44B7-952A-8C833C4590A2}" type="datetimeFigureOut">
               <a:rPr lang="en-IL" smtClean="0"/>
-              <a:t>01/01/2021</a:t>
+              <a:t>02/01/2021</a:t>
             </a:fld>
             <a:endParaRPr lang="en-IL"/>
           </a:p>
@@ -1843,7 +1843,7 @@
           <a:p>
             <a:fld id="{C9F7DFBD-92B2-44B7-952A-8C833C4590A2}" type="datetimeFigureOut">
               <a:rPr lang="en-IL" smtClean="0"/>
-              <a:t>01/01/2021</a:t>
+              <a:t>02/01/2021</a:t>
             </a:fld>
             <a:endParaRPr lang="en-IL"/>
           </a:p>
@@ -2119,7 +2119,7 @@
           <a:p>
             <a:fld id="{C9F7DFBD-92B2-44B7-952A-8C833C4590A2}" type="datetimeFigureOut">
               <a:rPr lang="en-IL" smtClean="0"/>
-              <a:t>01/01/2021</a:t>
+              <a:t>02/01/2021</a:t>
             </a:fld>
             <a:endParaRPr lang="en-IL"/>
           </a:p>
@@ -2387,7 +2387,7 @@
           <a:p>
             <a:fld id="{C9F7DFBD-92B2-44B7-952A-8C833C4590A2}" type="datetimeFigureOut">
               <a:rPr lang="en-IL" smtClean="0"/>
-              <a:t>01/01/2021</a:t>
+              <a:t>02/01/2021</a:t>
             </a:fld>
             <a:endParaRPr lang="en-IL"/>
           </a:p>
@@ -2802,7 +2802,7 @@
           <a:p>
             <a:fld id="{C9F7DFBD-92B2-44B7-952A-8C833C4590A2}" type="datetimeFigureOut">
               <a:rPr lang="en-IL" smtClean="0"/>
-              <a:t>01/01/2021</a:t>
+              <a:t>02/01/2021</a:t>
             </a:fld>
             <a:endParaRPr lang="en-IL"/>
           </a:p>
@@ -2944,7 +2944,7 @@
           <a:p>
             <a:fld id="{C9F7DFBD-92B2-44B7-952A-8C833C4590A2}" type="datetimeFigureOut">
               <a:rPr lang="en-IL" smtClean="0"/>
-              <a:t>01/01/2021</a:t>
+              <a:t>02/01/2021</a:t>
             </a:fld>
             <a:endParaRPr lang="en-IL"/>
           </a:p>
@@ -3057,7 +3057,7 @@
           <a:p>
             <a:fld id="{C9F7DFBD-92B2-44B7-952A-8C833C4590A2}" type="datetimeFigureOut">
               <a:rPr lang="en-IL" smtClean="0"/>
-              <a:t>01/01/2021</a:t>
+              <a:t>02/01/2021</a:t>
             </a:fld>
             <a:endParaRPr lang="en-IL"/>
           </a:p>
@@ -3370,7 +3370,7 @@
           <a:p>
             <a:fld id="{C9F7DFBD-92B2-44B7-952A-8C833C4590A2}" type="datetimeFigureOut">
               <a:rPr lang="en-IL" smtClean="0"/>
-              <a:t>01/01/2021</a:t>
+              <a:t>02/01/2021</a:t>
             </a:fld>
             <a:endParaRPr lang="en-IL"/>
           </a:p>
@@ -3659,7 +3659,7 @@
           <a:p>
             <a:fld id="{C9F7DFBD-92B2-44B7-952A-8C833C4590A2}" type="datetimeFigureOut">
               <a:rPr lang="en-IL" smtClean="0"/>
-              <a:t>01/01/2021</a:t>
+              <a:t>02/01/2021</a:t>
             </a:fld>
             <a:endParaRPr lang="en-IL"/>
           </a:p>
@@ -3902,7 +3902,7 @@
           <a:p>
             <a:fld id="{C9F7DFBD-92B2-44B7-952A-8C833C4590A2}" type="datetimeFigureOut">
               <a:rPr lang="en-IL" smtClean="0"/>
-              <a:t>01/01/2021</a:t>
+              <a:t>02/01/2021</a:t>
             </a:fld>
             <a:endParaRPr lang="en-IL"/>
           </a:p>
@@ -8562,12 +8562,12 @@
         <p:spPr>
           <a:xfrm>
             <a:off x="838199" y="1825625"/>
-            <a:ext cx="10809303" cy="4351338"/>
+            <a:ext cx="10809303" cy="4667250"/>
           </a:xfrm>
         </p:spPr>
         <p:txBody>
           <a:bodyPr>
-            <a:normAutofit/>
+            <a:normAutofit fontScale="92500" lnSpcReduction="10000"/>
           </a:bodyPr>
           <a:lstStyle/>
           <a:p>
@@ -8595,7 +8595,20 @@
                 <a:latin typeface="Calibri" panose="020F0502020204030204" pitchFamily="34" charset="0"/>
                 <a:cs typeface="Calibri" panose="020F0502020204030204" pitchFamily="34" charset="0"/>
               </a:rPr>
-              <a:t>coordinates on the grid of those locations.</a:t>
+              <a:t>Coordinates on the grid of those locations.</a:t>
+            </a:r>
+          </a:p>
+          <a:p>
+            <a:pPr lvl="1"/>
+            <a:r>
+              <a:rPr lang="en-US" sz="2200" dirty="0">
+                <a:solidFill>
+                  <a:srgbClr val="000000"/>
+                </a:solidFill>
+                <a:latin typeface="Calibri" panose="020F0502020204030204" pitchFamily="34" charset="0"/>
+                <a:cs typeface="Calibri" panose="020F0502020204030204" pitchFamily="34" charset="0"/>
+              </a:rPr>
+              <a:t>The locations can be changed.</a:t>
             </a:r>
           </a:p>
           <a:p>
@@ -8645,7 +8658,20 @@
                 <a:latin typeface="Calibri" panose="020F0502020204030204" pitchFamily="34" charset="0"/>
                 <a:cs typeface="Calibri" panose="020F0502020204030204" pitchFamily="34" charset="0"/>
               </a:rPr>
-              <a:t>maximum packages/envelopes the drone can held in his inventory.</a:t>
+              <a:t>Maximum packages/envelopes the drone can held in his inventory.</a:t>
+            </a:r>
+          </a:p>
+          <a:p>
+            <a:pPr lvl="1"/>
+            <a:r>
+              <a:rPr lang="en-US" sz="2150" dirty="0">
+                <a:solidFill>
+                  <a:srgbClr val="000000"/>
+                </a:solidFill>
+                <a:latin typeface="Calibri" panose="020F0502020204030204" pitchFamily="34" charset="0"/>
+                <a:cs typeface="Calibri" panose="020F0502020204030204" pitchFamily="34" charset="0"/>
+              </a:rPr>
+              <a:t>All capacities are parameterized and can be changed.</a:t>
             </a:r>
           </a:p>
           <a:p>
@@ -8803,15 +8829,6 @@
           </a:p>
           <a:p>
             <a:pPr lvl="1"/>
-            <a:r>
-              <a:rPr lang="en-US" sz="2000" dirty="0">
-                <a:solidFill>
-                  <a:srgbClr val="000000"/>
-                </a:solidFill>
-                <a:latin typeface="Consolas" panose="020B0609020204030204" pitchFamily="49" charset="0"/>
-              </a:rPr>
-              <a:t> </a:t>
-            </a:r>
             <a:r>
               <a:rPr lang="en-US" sz="2200" dirty="0">
                 <a:solidFill>
@@ -9137,7 +9154,7 @@
                 <a:latin typeface="Calibri" panose="020F0502020204030204" pitchFamily="34" charset="0"/>
                 <a:cs typeface="Calibri" panose="020F0502020204030204" pitchFamily="34" charset="0"/>
               </a:rPr>
-              <a:t>drone can move up to one step both row and column directions.</a:t>
+              <a:t>Drone can move up to one step both row and column directions.</a:t>
             </a:r>
           </a:p>
           <a:p>

</xml_diff>

<commit_message>
GUI: fix to winds on scenarios
</commit_message>
<xml_diff>
--- a/docs/final presentation.pptx
+++ b/docs/final presentation.pptx
@@ -1233,7 +1233,7 @@
           <a:p>
             <a:fld id="{C9F7DFBD-92B2-44B7-952A-8C833C4590A2}" type="datetimeFigureOut">
               <a:rPr lang="en-IL" smtClean="0"/>
-              <a:t>06/01/2021</a:t>
+              <a:t>07/01/2021</a:t>
             </a:fld>
             <a:endParaRPr lang="en-IL"/>
           </a:p>
@@ -1433,7 +1433,7 @@
           <a:p>
             <a:fld id="{C9F7DFBD-92B2-44B7-952A-8C833C4590A2}" type="datetimeFigureOut">
               <a:rPr lang="en-IL" smtClean="0"/>
-              <a:t>06/01/2021</a:t>
+              <a:t>07/01/2021</a:t>
             </a:fld>
             <a:endParaRPr lang="en-IL"/>
           </a:p>
@@ -1643,7 +1643,7 @@
           <a:p>
             <a:fld id="{C9F7DFBD-92B2-44B7-952A-8C833C4590A2}" type="datetimeFigureOut">
               <a:rPr lang="en-IL" smtClean="0"/>
-              <a:t>06/01/2021</a:t>
+              <a:t>07/01/2021</a:t>
             </a:fld>
             <a:endParaRPr lang="en-IL"/>
           </a:p>
@@ -1843,7 +1843,7 @@
           <a:p>
             <a:fld id="{C9F7DFBD-92B2-44B7-952A-8C833C4590A2}" type="datetimeFigureOut">
               <a:rPr lang="en-IL" smtClean="0"/>
-              <a:t>06/01/2021</a:t>
+              <a:t>07/01/2021</a:t>
             </a:fld>
             <a:endParaRPr lang="en-IL"/>
           </a:p>
@@ -2119,7 +2119,7 @@
           <a:p>
             <a:fld id="{C9F7DFBD-92B2-44B7-952A-8C833C4590A2}" type="datetimeFigureOut">
               <a:rPr lang="en-IL" smtClean="0"/>
-              <a:t>06/01/2021</a:t>
+              <a:t>07/01/2021</a:t>
             </a:fld>
             <a:endParaRPr lang="en-IL"/>
           </a:p>
@@ -2387,7 +2387,7 @@
           <a:p>
             <a:fld id="{C9F7DFBD-92B2-44B7-952A-8C833C4590A2}" type="datetimeFigureOut">
               <a:rPr lang="en-IL" smtClean="0"/>
-              <a:t>06/01/2021</a:t>
+              <a:t>07/01/2021</a:t>
             </a:fld>
             <a:endParaRPr lang="en-IL"/>
           </a:p>
@@ -2802,7 +2802,7 @@
           <a:p>
             <a:fld id="{C9F7DFBD-92B2-44B7-952A-8C833C4590A2}" type="datetimeFigureOut">
               <a:rPr lang="en-IL" smtClean="0"/>
-              <a:t>06/01/2021</a:t>
+              <a:t>07/01/2021</a:t>
             </a:fld>
             <a:endParaRPr lang="en-IL"/>
           </a:p>
@@ -2944,7 +2944,7 @@
           <a:p>
             <a:fld id="{C9F7DFBD-92B2-44B7-952A-8C833C4590A2}" type="datetimeFigureOut">
               <a:rPr lang="en-IL" smtClean="0"/>
-              <a:t>06/01/2021</a:t>
+              <a:t>07/01/2021</a:t>
             </a:fld>
             <a:endParaRPr lang="en-IL"/>
           </a:p>
@@ -3057,7 +3057,7 @@
           <a:p>
             <a:fld id="{C9F7DFBD-92B2-44B7-952A-8C833C4590A2}" type="datetimeFigureOut">
               <a:rPr lang="en-IL" smtClean="0"/>
-              <a:t>06/01/2021</a:t>
+              <a:t>07/01/2021</a:t>
             </a:fld>
             <a:endParaRPr lang="en-IL"/>
           </a:p>
@@ -3370,7 +3370,7 @@
           <a:p>
             <a:fld id="{C9F7DFBD-92B2-44B7-952A-8C833C4590A2}" type="datetimeFigureOut">
               <a:rPr lang="en-IL" smtClean="0"/>
-              <a:t>06/01/2021</a:t>
+              <a:t>07/01/2021</a:t>
             </a:fld>
             <a:endParaRPr lang="en-IL"/>
           </a:p>
@@ -3659,7 +3659,7 @@
           <a:p>
             <a:fld id="{C9F7DFBD-92B2-44B7-952A-8C833C4590A2}" type="datetimeFigureOut">
               <a:rPr lang="en-IL" smtClean="0"/>
-              <a:t>06/01/2021</a:t>
+              <a:t>07/01/2021</a:t>
             </a:fld>
             <a:endParaRPr lang="en-IL"/>
           </a:p>
@@ -3902,7 +3902,7 @@
           <a:p>
             <a:fld id="{C9F7DFBD-92B2-44B7-952A-8C833C4590A2}" type="datetimeFigureOut">
               <a:rPr lang="en-IL" smtClean="0"/>
-              <a:t>06/01/2021</a:t>
+              <a:t>07/01/2021</a:t>
             </a:fld>
             <a:endParaRPr lang="en-IL"/>
           </a:p>
@@ -5619,10 +5619,10 @@
       </p:sp>
       <p:pic>
         <p:nvPicPr>
-          <p:cNvPr id="9" name="Picture 8">
-            <a:extLst>
-              <a:ext uri="{FF2B5EF4-FFF2-40B4-BE49-F238E27FC236}">
-                <a16:creationId xmlns:a16="http://schemas.microsoft.com/office/drawing/2014/main" id="{797DB933-1EF9-49AD-B33C-836DDAADBFAB}"/>
+          <p:cNvPr id="5" name="Picture 4">
+            <a:extLst>
+              <a:ext uri="{FF2B5EF4-FFF2-40B4-BE49-F238E27FC236}">
+                <a16:creationId xmlns:a16="http://schemas.microsoft.com/office/drawing/2014/main" id="{E626AC3A-E6C6-422A-A36A-51AF81F0D3EB}"/>
               </a:ext>
             </a:extLst>
           </p:cNvPr>
@@ -5639,8 +5639,8 @@
         </p:blipFill>
         <p:spPr>
           <a:xfrm>
-            <a:off x="5370991" y="1324748"/>
-            <a:ext cx="6728438" cy="5050382"/>
+            <a:off x="5181600" y="1323093"/>
+            <a:ext cx="6815092" cy="5258559"/>
           </a:xfrm>
           <a:prstGeom prst="rect">
             <a:avLst/>
@@ -5783,36 +5783,6 @@
           </a:p>
         </p:txBody>
       </p:sp>
-      <p:pic>
-        <p:nvPicPr>
-          <p:cNvPr id="5" name="Picture 4">
-            <a:extLst>
-              <a:ext uri="{FF2B5EF4-FFF2-40B4-BE49-F238E27FC236}">
-                <a16:creationId xmlns:a16="http://schemas.microsoft.com/office/drawing/2014/main" id="{FE2E1BC4-42E2-4603-B12B-D095808EC22C}"/>
-              </a:ext>
-            </a:extLst>
-          </p:cNvPr>
-          <p:cNvPicPr>
-            <a:picLocks noChangeAspect="1"/>
-          </p:cNvPicPr>
-          <p:nvPr/>
-        </p:nvPicPr>
-        <p:blipFill>
-          <a:blip r:embed="rId2"/>
-          <a:stretch>
-            <a:fillRect/>
-          </a:stretch>
-        </p:blipFill>
-        <p:spPr>
-          <a:xfrm>
-            <a:off x="4648200" y="1825625"/>
-            <a:ext cx="7543800" cy="2379889"/>
-          </a:xfrm>
-          <a:prstGeom prst="rect">
-            <a:avLst/>
-          </a:prstGeom>
-        </p:spPr>
-      </p:pic>
       <p:sp>
         <p:nvSpPr>
           <p:cNvPr id="6" name="Content Placeholder 2">
@@ -6029,6 +5999,36 @@
           </a:p>
         </p:txBody>
       </p:sp>
+      <p:pic>
+        <p:nvPicPr>
+          <p:cNvPr id="7" name="Picture 6">
+            <a:extLst>
+              <a:ext uri="{FF2B5EF4-FFF2-40B4-BE49-F238E27FC236}">
+                <a16:creationId xmlns:a16="http://schemas.microsoft.com/office/drawing/2014/main" id="{07DF5C02-4456-46A0-924E-A09457C0C247}"/>
+              </a:ext>
+            </a:extLst>
+          </p:cNvPr>
+          <p:cNvPicPr>
+            <a:picLocks noChangeAspect="1"/>
+          </p:cNvPicPr>
+          <p:nvPr/>
+        </p:nvPicPr>
+        <p:blipFill>
+          <a:blip r:embed="rId2"/>
+          <a:stretch>
+            <a:fillRect/>
+          </a:stretch>
+        </p:blipFill>
+        <p:spPr>
+          <a:xfrm>
+            <a:off x="4477535" y="1825626"/>
+            <a:ext cx="7440065" cy="2376090"/>
+          </a:xfrm>
+          <a:prstGeom prst="rect">
+            <a:avLst/>
+          </a:prstGeom>
+        </p:spPr>
+      </p:pic>
     </p:spTree>
     <p:extLst>
       <p:ext uri="{BB962C8B-B14F-4D97-AF65-F5344CB8AC3E}">
@@ -6739,7 +6739,7 @@
             <p:ph idx="1"/>
             <p:extLst>
               <p:ext uri="{D42A27DB-BD31-4B8C-83A1-F6EECF244321}">
-                <p14:modId xmlns:p14="http://schemas.microsoft.com/office/powerpoint/2010/main" val="3009809922"/>
+                <p14:modId xmlns:p14="http://schemas.microsoft.com/office/powerpoint/2010/main" val="1902505545"/>
               </p:ext>
             </p:extLst>
           </p:nvPr>
@@ -7214,18 +7214,7 @@
                           <a:ea typeface="+mn-ea"/>
                           <a:cs typeface="+mn-cs"/>
                         </a:rPr>
-                        <a:t>Pickup only: all houses request package delivery, with a 4-package refill after a pickup. Partial use of Winds </a:t>
-                      </a:r>
-                      <a:r>
-                        <a:rPr lang="en-US" sz="2000" u="none" kern="1200" dirty="0">
-                          <a:solidFill>
-                            <a:schemeClr val="dk1"/>
-                          </a:solidFill>
-                          <a:latin typeface="+mn-lt"/>
-                          <a:ea typeface="+mn-ea"/>
-                          <a:cs typeface="+mn-cs"/>
-                        </a:rPr>
-                        <a:t>Mode</a:t>
+                        <a:t>Pickup only: all houses request package delivery, with a 4-package refill after a pickup. Partial use of Winds</a:t>
                       </a:r>
                       <a:endParaRPr lang="en-IL" sz="2000" u="none" dirty="0"/>
                     </a:p>

</xml_diff>

<commit_message>
Docs & Spectra: unreal explanation to UnrealLessMoves
</commit_message>
<xml_diff>
--- a/docs/final presentation.pptx
+++ b/docs/final presentation.pptx
@@ -1233,7 +1233,7 @@
           <a:p>
             <a:fld id="{C9F7DFBD-92B2-44B7-952A-8C833C4590A2}" type="datetimeFigureOut">
               <a:rPr lang="en-IL" smtClean="0"/>
-              <a:t>07/01/2021</a:t>
+              <a:t>11/01/2021</a:t>
             </a:fld>
             <a:endParaRPr lang="en-IL"/>
           </a:p>
@@ -1433,7 +1433,7 @@
           <a:p>
             <a:fld id="{C9F7DFBD-92B2-44B7-952A-8C833C4590A2}" type="datetimeFigureOut">
               <a:rPr lang="en-IL" smtClean="0"/>
-              <a:t>07/01/2021</a:t>
+              <a:t>11/01/2021</a:t>
             </a:fld>
             <a:endParaRPr lang="en-IL"/>
           </a:p>
@@ -1643,7 +1643,7 @@
           <a:p>
             <a:fld id="{C9F7DFBD-92B2-44B7-952A-8C833C4590A2}" type="datetimeFigureOut">
               <a:rPr lang="en-IL" smtClean="0"/>
-              <a:t>07/01/2021</a:t>
+              <a:t>11/01/2021</a:t>
             </a:fld>
             <a:endParaRPr lang="en-IL"/>
           </a:p>
@@ -1843,7 +1843,7 @@
           <a:p>
             <a:fld id="{C9F7DFBD-92B2-44B7-952A-8C833C4590A2}" type="datetimeFigureOut">
               <a:rPr lang="en-IL" smtClean="0"/>
-              <a:t>07/01/2021</a:t>
+              <a:t>11/01/2021</a:t>
             </a:fld>
             <a:endParaRPr lang="en-IL"/>
           </a:p>
@@ -2119,7 +2119,7 @@
           <a:p>
             <a:fld id="{C9F7DFBD-92B2-44B7-952A-8C833C4590A2}" type="datetimeFigureOut">
               <a:rPr lang="en-IL" smtClean="0"/>
-              <a:t>07/01/2021</a:t>
+              <a:t>11/01/2021</a:t>
             </a:fld>
             <a:endParaRPr lang="en-IL"/>
           </a:p>
@@ -2387,7 +2387,7 @@
           <a:p>
             <a:fld id="{C9F7DFBD-92B2-44B7-952A-8C833C4590A2}" type="datetimeFigureOut">
               <a:rPr lang="en-IL" smtClean="0"/>
-              <a:t>07/01/2021</a:t>
+              <a:t>11/01/2021</a:t>
             </a:fld>
             <a:endParaRPr lang="en-IL"/>
           </a:p>
@@ -2802,7 +2802,7 @@
           <a:p>
             <a:fld id="{C9F7DFBD-92B2-44B7-952A-8C833C4590A2}" type="datetimeFigureOut">
               <a:rPr lang="en-IL" smtClean="0"/>
-              <a:t>07/01/2021</a:t>
+              <a:t>11/01/2021</a:t>
             </a:fld>
             <a:endParaRPr lang="en-IL"/>
           </a:p>
@@ -2944,7 +2944,7 @@
           <a:p>
             <a:fld id="{C9F7DFBD-92B2-44B7-952A-8C833C4590A2}" type="datetimeFigureOut">
               <a:rPr lang="en-IL" smtClean="0"/>
-              <a:t>07/01/2021</a:t>
+              <a:t>11/01/2021</a:t>
             </a:fld>
             <a:endParaRPr lang="en-IL"/>
           </a:p>
@@ -3057,7 +3057,7 @@
           <a:p>
             <a:fld id="{C9F7DFBD-92B2-44B7-952A-8C833C4590A2}" type="datetimeFigureOut">
               <a:rPr lang="en-IL" smtClean="0"/>
-              <a:t>07/01/2021</a:t>
+              <a:t>11/01/2021</a:t>
             </a:fld>
             <a:endParaRPr lang="en-IL"/>
           </a:p>
@@ -3370,7 +3370,7 @@
           <a:p>
             <a:fld id="{C9F7DFBD-92B2-44B7-952A-8C833C4590A2}" type="datetimeFigureOut">
               <a:rPr lang="en-IL" smtClean="0"/>
-              <a:t>07/01/2021</a:t>
+              <a:t>11/01/2021</a:t>
             </a:fld>
             <a:endParaRPr lang="en-IL"/>
           </a:p>
@@ -3659,7 +3659,7 @@
           <a:p>
             <a:fld id="{C9F7DFBD-92B2-44B7-952A-8C833C4590A2}" type="datetimeFigureOut">
               <a:rPr lang="en-IL" smtClean="0"/>
-              <a:t>07/01/2021</a:t>
+              <a:t>11/01/2021</a:t>
             </a:fld>
             <a:endParaRPr lang="en-IL"/>
           </a:p>
@@ -3902,7 +3902,7 @@
           <a:p>
             <a:fld id="{C9F7DFBD-92B2-44B7-952A-8C833C4590A2}" type="datetimeFigureOut">
               <a:rPr lang="en-IL" smtClean="0"/>
-              <a:t>07/01/2021</a:t>
+              <a:t>11/01/2021</a:t>
             </a:fld>
             <a:endParaRPr lang="en-IL"/>
           </a:p>
@@ -5007,15 +5007,15 @@
             </a:r>
             <a:r>
               <a:rPr lang="en-US" sz="1800" dirty="0"/>
-              <a:t> features that can be “turned off” at the </a:t>
-            </a:r>
-            <a:r>
-              <a:rPr lang="en-US" sz="1800" dirty="0" err="1"/>
-              <a:t>specidication</a:t>
+              <a:t> features that can be “turned off” at </a:t>
+            </a:r>
+            <a:r>
+              <a:rPr lang="en-US" sz="1800"/>
+              <a:t>the specification </a:t>
             </a:r>
             <a:r>
               <a:rPr lang="en-US" sz="1800" dirty="0"/>
-              <a:t> files.  </a:t>
+              <a:t>files.  </a:t>
             </a:r>
           </a:p>
           <a:p>
@@ -5249,25 +5249,25 @@
         </p:nvSpPr>
         <p:spPr>
           <a:xfrm>
-            <a:off x="577049" y="1429306"/>
-            <a:ext cx="10776751" cy="5184558"/>
+            <a:off x="577049" y="1429305"/>
+            <a:ext cx="10776751" cy="5326601"/>
           </a:xfrm>
         </p:spPr>
         <p:txBody>
           <a:bodyPr>
-            <a:normAutofit/>
+            <a:normAutofit fontScale="92500" lnSpcReduction="10000"/>
           </a:bodyPr>
           <a:lstStyle/>
           <a:p>
             <a:r>
-              <a:rPr lang="en-US" sz="2400" u="sng" dirty="0">
+              <a:rPr lang="en-US" u="sng" dirty="0">
                 <a:latin typeface="Calibri" panose="020F0502020204030204" pitchFamily="34" charset="0"/>
                 <a:cs typeface="Calibri" panose="020F0502020204030204" pitchFamily="34" charset="0"/>
               </a:rPr>
               <a:t>Unrealizable</a:t>
             </a:r>
             <a:r>
-              <a:rPr lang="en-US" sz="2400" dirty="0">
+              <a:rPr lang="en-US" dirty="0">
                 <a:latin typeface="Calibri" panose="020F0502020204030204" pitchFamily="34" charset="0"/>
                 <a:cs typeface="Calibri" panose="020F0502020204030204" pitchFamily="34" charset="0"/>
               </a:rPr>
@@ -5277,7 +5277,7 @@
           <a:p>
             <a:pPr lvl="1"/>
             <a:r>
-              <a:rPr lang="en-US" sz="2200" dirty="0">
+              <a:rPr lang="en-US" dirty="0">
                 <a:latin typeface="Calibri" panose="020F0502020204030204" pitchFamily="34" charset="0"/>
                 <a:cs typeface="Calibri" panose="020F0502020204030204" pitchFamily="34" charset="0"/>
               </a:rPr>
@@ -5287,7 +5287,7 @@
           <a:p>
             <a:pPr lvl="2"/>
             <a:r>
-              <a:rPr lang="en-US" sz="1800" dirty="0">
+              <a:rPr lang="en-US" dirty="0">
                 <a:latin typeface="Calibri" panose="020F0502020204030204" pitchFamily="34" charset="0"/>
                 <a:cs typeface="Calibri" panose="020F0502020204030204" pitchFamily="34" charset="0"/>
               </a:rPr>
@@ -5297,21 +5297,21 @@
           <a:p>
             <a:pPr lvl="2"/>
             <a:r>
-              <a:rPr lang="en-US" sz="1800" dirty="0">
+              <a:rPr lang="en-US" dirty="0">
                 <a:latin typeface="Calibri" panose="020F0502020204030204" pitchFamily="34" charset="0"/>
                 <a:cs typeface="Calibri" panose="020F0502020204030204" pitchFamily="34" charset="0"/>
               </a:rPr>
               <a:t>Such as when priority mode is true and can not pick up any more requests from houses (</a:t>
             </a:r>
             <a:r>
-              <a:rPr lang="en-US" sz="1800" dirty="0" err="1">
+              <a:rPr lang="en-US" dirty="0" err="1">
                 <a:latin typeface="Calibri" panose="020F0502020204030204" pitchFamily="34" charset="0"/>
                 <a:cs typeface="Calibri" panose="020F0502020204030204" pitchFamily="34" charset="0"/>
               </a:rPr>
               <a:t>priorityCap</a:t>
             </a:r>
             <a:r>
-              <a:rPr lang="en-US" sz="1800" dirty="0">
+              <a:rPr lang="en-US" dirty="0">
                 <a:latin typeface="Calibri" panose="020F0502020204030204" pitchFamily="34" charset="0"/>
                 <a:cs typeface="Calibri" panose="020F0502020204030204" pitchFamily="34" charset="0"/>
               </a:rPr>
@@ -5321,7 +5321,7 @@
           <a:p>
             <a:pPr lvl="1"/>
             <a:r>
-              <a:rPr lang="en-US" sz="2200" dirty="0">
+              <a:rPr lang="en-US" dirty="0">
                 <a:latin typeface="Calibri" panose="020F0502020204030204" pitchFamily="34" charset="0"/>
                 <a:cs typeface="Calibri" panose="020F0502020204030204" pitchFamily="34" charset="0"/>
               </a:rPr>
@@ -5331,7 +5331,7 @@
           <a:p>
             <a:pPr lvl="2"/>
             <a:r>
-              <a:rPr lang="en-US" sz="1800" dirty="0">
+              <a:rPr lang="en-US" dirty="0">
                 <a:latin typeface="Calibri" panose="020F0502020204030204" pitchFamily="34" charset="0"/>
                 <a:cs typeface="Calibri" panose="020F0502020204030204" pitchFamily="34" charset="0"/>
               </a:rPr>
@@ -5341,21 +5341,21 @@
           <a:p>
             <a:pPr lvl="2"/>
             <a:r>
-              <a:rPr lang="en-US" sz="1800" dirty="0">
+              <a:rPr lang="en-US" dirty="0">
                 <a:latin typeface="Calibri" panose="020F0502020204030204" pitchFamily="34" charset="0"/>
                 <a:cs typeface="Calibri" panose="020F0502020204030204" pitchFamily="34" charset="0"/>
               </a:rPr>
               <a:t>System can only decide on a single </a:t>
             </a:r>
             <a:r>
-              <a:rPr lang="en-US" sz="1800" dirty="0" err="1">
+              <a:rPr lang="en-US" dirty="0" err="1">
                 <a:latin typeface="Calibri" panose="020F0502020204030204" pitchFamily="34" charset="0"/>
                 <a:cs typeface="Calibri" panose="020F0502020204030204" pitchFamily="34" charset="0"/>
               </a:rPr>
               <a:t>dropOffThisState</a:t>
             </a:r>
             <a:r>
-              <a:rPr lang="en-US" sz="1800" dirty="0">
+              <a:rPr lang="en-US" dirty="0">
                 <a:latin typeface="Calibri" panose="020F0502020204030204" pitchFamily="34" charset="0"/>
                 <a:cs typeface="Calibri" panose="020F0502020204030204" pitchFamily="34" charset="0"/>
               </a:rPr>
@@ -5365,7 +5365,7 @@
           <a:p>
             <a:pPr lvl="2"/>
             <a:r>
-              <a:rPr lang="en-US" sz="1800" dirty="0">
+              <a:rPr lang="en-US" dirty="0">
                 <a:latin typeface="Calibri" panose="020F0502020204030204" pitchFamily="34" charset="0"/>
                 <a:cs typeface="Calibri" panose="020F0502020204030204" pitchFamily="34" charset="0"/>
               </a:rPr>
@@ -5375,13 +5375,13 @@
           <a:p>
             <a:pPr lvl="2"/>
             <a:r>
-              <a:rPr lang="en-US" sz="1800" dirty="0">
+              <a:rPr lang="en-US" dirty="0">
                 <a:latin typeface="Calibri" panose="020F0502020204030204" pitchFamily="34" charset="0"/>
                 <a:cs typeface="Calibri" panose="020F0502020204030204" pitchFamily="34" charset="0"/>
               </a:rPr>
               <a:t>Must-pick-up it picks up every request it runs into so it might carry both types – contradiction.</a:t>
             </a:r>
-            <a:endParaRPr lang="he-IL" sz="1800" dirty="0">
+            <a:endParaRPr lang="he-IL" dirty="0">
               <a:latin typeface="Calibri" panose="020F0502020204030204" pitchFamily="34" charset="0"/>
               <a:cs typeface="Calibri" panose="020F0502020204030204" pitchFamily="34" charset="0"/>
             </a:endParaRPr>
@@ -5389,7 +5389,7 @@
           <a:p>
             <a:pPr lvl="1"/>
             <a:r>
-              <a:rPr lang="en-US" sz="2200" dirty="0">
+              <a:rPr lang="en-US" dirty="0">
                 <a:latin typeface="Calibri" panose="020F0502020204030204" pitchFamily="34" charset="0"/>
                 <a:cs typeface="Calibri" panose="020F0502020204030204" pitchFamily="34" charset="0"/>
               </a:rPr>
@@ -5399,7 +5399,7 @@
           <a:p>
             <a:pPr lvl="2"/>
             <a:r>
-              <a:rPr lang="en-US" sz="1800" dirty="0">
+              <a:rPr lang="en-US" dirty="0">
                 <a:latin typeface="Calibri" panose="020F0502020204030204" pitchFamily="34" charset="0"/>
                 <a:cs typeface="Calibri" panose="020F0502020204030204" pitchFamily="34" charset="0"/>
               </a:rPr>
@@ -5409,7 +5409,7 @@
           <a:p>
             <a:pPr lvl="1"/>
             <a:r>
-              <a:rPr lang="en-US" sz="2200" dirty="0">
+              <a:rPr lang="en-US" dirty="0">
                 <a:latin typeface="Calibri" panose="020F0502020204030204" pitchFamily="34" charset="0"/>
                 <a:cs typeface="Calibri" panose="020F0502020204030204" pitchFamily="34" charset="0"/>
               </a:rPr>
@@ -5419,11 +5419,21 @@
           <a:p>
             <a:pPr lvl="2"/>
             <a:r>
-              <a:rPr lang="en-US" sz="1800" dirty="0">
+              <a:rPr lang="en-US" dirty="0">
                 <a:latin typeface="Calibri" panose="020F0502020204030204" pitchFamily="34" charset="0"/>
                 <a:cs typeface="Calibri" panose="020F0502020204030204" pitchFamily="34" charset="0"/>
               </a:rPr>
-              <a:t>Tries enforce the drone after drop off, if there is a request, pick it up in at most 3 steps. </a:t>
+              <a:t>Tries to enforce the drone that after a drop off, if there is a request, pick it up in at most 3 steps. </a:t>
+            </a:r>
+          </a:p>
+          <a:p>
+            <a:pPr lvl="2"/>
+            <a:r>
+              <a:rPr lang="en-US" dirty="0">
+                <a:latin typeface="Calibri" panose="020F0502020204030204" pitchFamily="34" charset="0"/>
+                <a:cs typeface="Calibri" panose="020F0502020204030204" pitchFamily="34" charset="0"/>
+              </a:rPr>
+              <a:t>There exists a situation where the drone cannot make a pick-up after just 3 steps, for example when its battery is empty and he must pass by the charging station.</a:t>
             </a:r>
           </a:p>
         </p:txBody>

</xml_diff>